<commit_message>
Update presentation with new slide and CLI examples
</commit_message>
<xml_diff>
--- a/RaspberryRemote.pptx
+++ b/RaspberryRemote.pptx
@@ -13,11 +13,12 @@
     <p:sldId id="262" r:id="rId7"/>
     <p:sldId id="263" r:id="rId8"/>
     <p:sldId id="264" r:id="rId9"/>
-    <p:sldId id="265" r:id="rId10"/>
-    <p:sldId id="266" r:id="rId11"/>
-    <p:sldId id="267" r:id="rId12"/>
-    <p:sldId id="261" r:id="rId13"/>
-    <p:sldId id="268" r:id="rId14"/>
+    <p:sldId id="269" r:id="rId10"/>
+    <p:sldId id="265" r:id="rId11"/>
+    <p:sldId id="266" r:id="rId12"/>
+    <p:sldId id="267" r:id="rId13"/>
+    <p:sldId id="261" r:id="rId14"/>
+    <p:sldId id="268" r:id="rId15"/>
   </p:sldIdLst>
   <p:sldSz cx="12192000" cy="6858000"/>
   <p:notesSz cx="6858000" cy="9144000"/>
@@ -129,6 +130,7 @@
             <p14:sldId id="262"/>
             <p14:sldId id="263"/>
             <p14:sldId id="264"/>
+            <p14:sldId id="269"/>
             <p14:sldId id="265"/>
             <p14:sldId id="266"/>
             <p14:sldId id="267"/>
@@ -137,6 +139,9 @@
           </p14:sldIdLst>
         </p14:section>
       </p14:sectionLst>
+    </p:ext>
+    <p:ext uri="{EFAFB233-063F-42B5-8137-9DF3F51BA10A}">
+      <p15:sldGuideLst xmlns:p15="http://schemas.microsoft.com/office/powerpoint/2012/main"/>
     </p:ext>
   </p:extLst>
 </p:presentation>
@@ -3484,7 +3489,7 @@
           <p:cNvPr id="2" name="Title 1">
             <a:extLst>
               <a:ext uri="{FF2B5EF4-FFF2-40B4-BE49-F238E27FC236}">
-                <a16:creationId xmlns:a16="http://schemas.microsoft.com/office/drawing/2014/main" id="{8DD42C43-04BD-4457-B297-EBE7D4C1BEB7}"/>
+                <a16:creationId xmlns:a16="http://schemas.microsoft.com/office/drawing/2014/main" id="{22A32BD3-55AE-4D95-A3D9-4423A3E146DA}"/>
               </a:ext>
             </a:extLst>
           </p:cNvPr>
@@ -3495,33 +3500,36 @@
             <p:ph type="title"/>
           </p:nvPr>
         </p:nvSpPr>
-        <p:spPr/>
-        <p:txBody>
-          <a:bodyPr/>
-          <a:lstStyle/>
-          <a:p>
-            <a:r>
-              <a:rPr lang="en-US" dirty="0"/>
-              <a:t>Send commands</a:t>
+        <p:spPr>
+          <a:xfrm>
+            <a:off x="252919" y="1123838"/>
+            <a:ext cx="2947482" cy="2072124"/>
+          </a:xfrm>
+        </p:spPr>
+        <p:txBody>
+          <a:bodyPr/>
+          <a:lstStyle/>
+          <a:p>
+            <a:r>
+              <a:rPr lang="en-US" dirty="0"/>
+              <a:t>Getting valid commands</a:t>
             </a:r>
           </a:p>
         </p:txBody>
       </p:sp>
       <p:pic>
         <p:nvPicPr>
-          <p:cNvPr id="4" name="Content Placeholder 3">
+          <p:cNvPr id="13" name="Picture 12">
             <a:extLst>
               <a:ext uri="{FF2B5EF4-FFF2-40B4-BE49-F238E27FC236}">
-                <a16:creationId xmlns:a16="http://schemas.microsoft.com/office/drawing/2014/main" id="{40A88314-661D-43DA-89A6-0BF2EA963ED7}"/>
+                <a16:creationId xmlns:a16="http://schemas.microsoft.com/office/drawing/2014/main" id="{C068B359-5185-45B8-A558-FD14F570DE17}"/>
               </a:ext>
             </a:extLst>
           </p:cNvPr>
           <p:cNvPicPr>
-            <a:picLocks noGrp="1" noChangeAspect="1"/>
+            <a:picLocks noChangeAspect="1"/>
           </p:cNvPicPr>
-          <p:nvPr>
-            <p:ph idx="1"/>
-          </p:nvPr>
+          <p:nvPr/>
         </p:nvPicPr>
         <p:blipFill>
           <a:blip r:embed="rId2"/>
@@ -3531,18 +3539,97 @@
         </p:blipFill>
         <p:spPr>
           <a:xfrm>
-            <a:off x="3641506" y="1123838"/>
-            <a:ext cx="8297575" cy="4601182"/>
+            <a:off x="4457699" y="0"/>
+            <a:ext cx="6145089" cy="6858000"/>
           </a:xfrm>
           <a:prstGeom prst="rect">
             <a:avLst/>
           </a:prstGeom>
         </p:spPr>
       </p:pic>
+      <p:sp>
+        <p:nvSpPr>
+          <p:cNvPr id="4" name="Title 1">
+            <a:extLst>
+              <a:ext uri="{FF2B5EF4-FFF2-40B4-BE49-F238E27FC236}">
+                <a16:creationId xmlns:a16="http://schemas.microsoft.com/office/drawing/2014/main" id="{8C7CA41D-79ED-4E5E-B692-97E3B8BBF415}"/>
+              </a:ext>
+            </a:extLst>
+          </p:cNvPr>
+          <p:cNvSpPr txBox="1">
+            <a:spLocks/>
+          </p:cNvSpPr>
+          <p:nvPr/>
+        </p:nvSpPr>
+        <p:spPr>
+          <a:xfrm>
+            <a:off x="161923" y="2625977"/>
+            <a:ext cx="3129473" cy="2072124"/>
+          </a:xfrm>
+          <a:prstGeom prst="rect">
+            <a:avLst/>
+          </a:prstGeom>
+        </p:spPr>
+        <p:txBody>
+          <a:bodyPr vert="horz" lIns="91440" tIns="45720" rIns="91440" bIns="45720" rtlCol="0" anchor="ctr">
+            <a:normAutofit/>
+          </a:bodyPr>
+          <a:lstStyle>
+            <a:lvl1pPr algn="l" defTabSz="914400" rtl="0" eaLnBrk="1" latinLnBrk="0" hangingPunct="1">
+              <a:lnSpc>
+                <a:spcPct val="90000"/>
+              </a:lnSpc>
+              <a:spcBef>
+                <a:spcPct val="0"/>
+              </a:spcBef>
+              <a:buNone/>
+              <a:defRPr sz="3600" kern="1200" spc="-60" baseline="0">
+                <a:solidFill>
+                  <a:srgbClr val="FFFFFF"/>
+                </a:solidFill>
+                <a:latin typeface="+mj-lt"/>
+                <a:ea typeface="+mj-ea"/>
+                <a:cs typeface="+mj-cs"/>
+              </a:defRPr>
+            </a:lvl1pPr>
+          </a:lstStyle>
+          <a:p>
+            <a:pPr algn="ctr"/>
+            <a:r>
+              <a:rPr lang="en-US" sz="1400" dirty="0" err="1">
+                <a:latin typeface="Courier New" panose="02070309020205020404" pitchFamily="49" charset="0"/>
+                <a:cs typeface="Courier New" panose="02070309020205020404" pitchFamily="49" charset="0"/>
+              </a:rPr>
+              <a:t>irsend</a:t>
+            </a:r>
+            <a:r>
+              <a:rPr lang="en-US" sz="1400" dirty="0">
+                <a:latin typeface="Courier New" panose="02070309020205020404" pitchFamily="49" charset="0"/>
+                <a:cs typeface="Courier New" panose="02070309020205020404" pitchFamily="49" charset="0"/>
+              </a:rPr>
+              <a:t> list “</a:t>
+            </a:r>
+            <a:r>
+              <a:rPr lang="en-US" sz="1400" dirty="0" err="1">
+                <a:latin typeface="Courier New" panose="02070309020205020404" pitchFamily="49" charset="0"/>
+                <a:cs typeface="Courier New" panose="02070309020205020404" pitchFamily="49" charset="0"/>
+              </a:rPr>
+              <a:t>remote_name</a:t>
+            </a:r>
+            <a:r>
+              <a:rPr lang="en-US" sz="1400" dirty="0">
+                <a:latin typeface="Courier New" panose="02070309020205020404" pitchFamily="49" charset="0"/>
+                <a:cs typeface="Courier New" panose="02070309020205020404" pitchFamily="49" charset="0"/>
+              </a:rPr>
+              <a:t>” “”</a:t>
+            </a:r>
+          </a:p>
+        </p:txBody>
+      </p:sp>
     </p:spTree>
     <p:extLst>
       <p:ext uri="{BB962C8B-B14F-4D97-AF65-F5344CB8AC3E}">
-        <p14:creationId xmlns:p14="http://schemas.microsoft.com/office/powerpoint/2010/main" val="2372482367"/>
+        <p14:creationId xmlns:p14="http://schemas.microsoft.com/office/powerpoint/2010/main" val="3100803108"/>
       </p:ext>
     </p:extLst>
   </p:cSld>
@@ -3569,40 +3656,12 @@
           <a:chExt cx="0" cy="0"/>
         </a:xfrm>
       </p:grpSpPr>
-      <p:sp>
-        <p:nvSpPr>
-          <p:cNvPr id="2" name="Title 1">
-            <a:extLst>
-              <a:ext uri="{FF2B5EF4-FFF2-40B4-BE49-F238E27FC236}">
-                <a16:creationId xmlns:a16="http://schemas.microsoft.com/office/drawing/2014/main" id="{6C651EF3-4050-4FAA-AF99-12D9A40E9C22}"/>
-              </a:ext>
-            </a:extLst>
-          </p:cNvPr>
-          <p:cNvSpPr>
-            <a:spLocks noGrp="1"/>
-          </p:cNvSpPr>
-          <p:nvPr>
-            <p:ph type="title"/>
-          </p:nvPr>
-        </p:nvSpPr>
-        <p:spPr/>
-        <p:txBody>
-          <a:bodyPr/>
-          <a:lstStyle/>
-          <a:p>
-            <a:r>
-              <a:rPr lang="en-US" dirty="0"/>
-              <a:t>Listen for commands</a:t>
-            </a:r>
-          </a:p>
-        </p:txBody>
-      </p:sp>
       <p:pic>
         <p:nvPicPr>
           <p:cNvPr id="4" name="Content Placeholder 3">
             <a:extLst>
               <a:ext uri="{FF2B5EF4-FFF2-40B4-BE49-F238E27FC236}">
-                <a16:creationId xmlns:a16="http://schemas.microsoft.com/office/drawing/2014/main" id="{45A3B90C-7C9E-4AAF-B8F2-C6992069D1EC}"/>
+                <a16:creationId xmlns:a16="http://schemas.microsoft.com/office/drawing/2014/main" id="{40A88314-661D-43DA-89A6-0BF2EA963ED7}"/>
               </a:ext>
             </a:extLst>
           </p:cNvPr>
@@ -3621,18 +3680,144 @@
         </p:blipFill>
         <p:spPr>
           <a:xfrm>
-            <a:off x="4076700" y="-4572"/>
-            <a:ext cx="7334758" cy="6858000"/>
+            <a:off x="3641506" y="1123838"/>
+            <a:ext cx="8297575" cy="4601182"/>
           </a:xfrm>
           <a:prstGeom prst="rect">
             <a:avLst/>
           </a:prstGeom>
         </p:spPr>
       </p:pic>
+      <p:sp>
+        <p:nvSpPr>
+          <p:cNvPr id="10" name="Title 1">
+            <a:extLst>
+              <a:ext uri="{FF2B5EF4-FFF2-40B4-BE49-F238E27FC236}">
+                <a16:creationId xmlns:a16="http://schemas.microsoft.com/office/drawing/2014/main" id="{5A7EC3DB-54C8-49AC-9CC5-12477A3CDD42}"/>
+              </a:ext>
+            </a:extLst>
+          </p:cNvPr>
+          <p:cNvSpPr>
+            <a:spLocks noGrp="1"/>
+          </p:cNvSpPr>
+          <p:nvPr>
+            <p:ph type="title"/>
+          </p:nvPr>
+        </p:nvSpPr>
+        <p:spPr>
+          <a:xfrm>
+            <a:off x="252919" y="1123838"/>
+            <a:ext cx="2947482" cy="2072124"/>
+          </a:xfrm>
+        </p:spPr>
+        <p:txBody>
+          <a:bodyPr/>
+          <a:lstStyle/>
+          <a:p>
+            <a:r>
+              <a:rPr lang="en-US" dirty="0"/>
+              <a:t>Send commands</a:t>
+            </a:r>
+          </a:p>
+        </p:txBody>
+      </p:sp>
+      <p:sp>
+        <p:nvSpPr>
+          <p:cNvPr id="11" name="Title 1">
+            <a:extLst>
+              <a:ext uri="{FF2B5EF4-FFF2-40B4-BE49-F238E27FC236}">
+                <a16:creationId xmlns:a16="http://schemas.microsoft.com/office/drawing/2014/main" id="{1D4D3C44-4315-4262-9F5B-98E5F2639E55}"/>
+              </a:ext>
+            </a:extLst>
+          </p:cNvPr>
+          <p:cNvSpPr txBox="1">
+            <a:spLocks/>
+          </p:cNvSpPr>
+          <p:nvPr/>
+        </p:nvSpPr>
+        <p:spPr>
+          <a:xfrm>
+            <a:off x="161923" y="2625977"/>
+            <a:ext cx="3129473" cy="2072124"/>
+          </a:xfrm>
+          <a:prstGeom prst="rect">
+            <a:avLst/>
+          </a:prstGeom>
+        </p:spPr>
+        <p:txBody>
+          <a:bodyPr vert="horz" lIns="91440" tIns="45720" rIns="91440" bIns="45720" rtlCol="0" anchor="ctr">
+            <a:normAutofit/>
+          </a:bodyPr>
+          <a:lstStyle>
+            <a:lvl1pPr algn="l" defTabSz="914400" rtl="0" eaLnBrk="1" latinLnBrk="0" hangingPunct="1">
+              <a:lnSpc>
+                <a:spcPct val="90000"/>
+              </a:lnSpc>
+              <a:spcBef>
+                <a:spcPct val="0"/>
+              </a:spcBef>
+              <a:buNone/>
+              <a:defRPr sz="3600" kern="1200" spc="-60" baseline="0">
+                <a:solidFill>
+                  <a:srgbClr val="FFFFFF"/>
+                </a:solidFill>
+                <a:latin typeface="+mj-lt"/>
+                <a:ea typeface="+mj-ea"/>
+                <a:cs typeface="+mj-cs"/>
+              </a:defRPr>
+            </a:lvl1pPr>
+          </a:lstStyle>
+          <a:p>
+            <a:pPr algn="ctr"/>
+            <a:r>
+              <a:rPr lang="en-US" sz="1400" dirty="0" err="1">
+                <a:latin typeface="Courier New" panose="02070309020205020404" pitchFamily="49" charset="0"/>
+                <a:cs typeface="Courier New" panose="02070309020205020404" pitchFamily="49" charset="0"/>
+              </a:rPr>
+              <a:t>irsend</a:t>
+            </a:r>
+            <a:r>
+              <a:rPr lang="en-US" sz="1400" dirty="0">
+                <a:latin typeface="Courier New" panose="02070309020205020404" pitchFamily="49" charset="0"/>
+                <a:cs typeface="Courier New" panose="02070309020205020404" pitchFamily="49" charset="0"/>
+              </a:rPr>
+              <a:t> </a:t>
+            </a:r>
+            <a:r>
+              <a:rPr lang="en-US" sz="1400" dirty="0" err="1">
+                <a:latin typeface="Courier New" panose="02070309020205020404" pitchFamily="49" charset="0"/>
+                <a:cs typeface="Courier New" panose="02070309020205020404" pitchFamily="49" charset="0"/>
+              </a:rPr>
+              <a:t>send_once</a:t>
+            </a:r>
+            <a:r>
+              <a:rPr lang="en-US" sz="1400" dirty="0">
+                <a:latin typeface="Courier New" panose="02070309020205020404" pitchFamily="49" charset="0"/>
+                <a:cs typeface="Courier New" panose="02070309020205020404" pitchFamily="49" charset="0"/>
+              </a:rPr>
+              <a:t> “</a:t>
+            </a:r>
+            <a:r>
+              <a:rPr lang="en-US" sz="1400" dirty="0" err="1">
+                <a:latin typeface="Courier New" panose="02070309020205020404" pitchFamily="49" charset="0"/>
+                <a:cs typeface="Courier New" panose="02070309020205020404" pitchFamily="49" charset="0"/>
+              </a:rPr>
+              <a:t>remote_name</a:t>
+            </a:r>
+            <a:r>
+              <a:rPr lang="en-US" sz="1400" dirty="0">
+                <a:latin typeface="Courier New" panose="02070309020205020404" pitchFamily="49" charset="0"/>
+                <a:cs typeface="Courier New" panose="02070309020205020404" pitchFamily="49" charset="0"/>
+              </a:rPr>
+              <a:t>” “key”</a:t>
+            </a:r>
+          </a:p>
+        </p:txBody>
+      </p:sp>
     </p:spTree>
     <p:extLst>
       <p:ext uri="{BB962C8B-B14F-4D97-AF65-F5344CB8AC3E}">
-        <p14:creationId xmlns:p14="http://schemas.microsoft.com/office/powerpoint/2010/main" val="2851813677"/>
+        <p14:creationId xmlns:p14="http://schemas.microsoft.com/office/powerpoint/2010/main" val="2372482367"/>
       </p:ext>
     </p:extLst>
   </p:cSld>
@@ -3659,6 +3844,163 @@
           <a:chExt cx="0" cy="0"/>
         </a:xfrm>
       </p:grpSpPr>
+      <p:pic>
+        <p:nvPicPr>
+          <p:cNvPr id="4" name="Content Placeholder 3">
+            <a:extLst>
+              <a:ext uri="{FF2B5EF4-FFF2-40B4-BE49-F238E27FC236}">
+                <a16:creationId xmlns:a16="http://schemas.microsoft.com/office/drawing/2014/main" id="{45A3B90C-7C9E-4AAF-B8F2-C6992069D1EC}"/>
+              </a:ext>
+            </a:extLst>
+          </p:cNvPr>
+          <p:cNvPicPr>
+            <a:picLocks noGrp="1" noChangeAspect="1"/>
+          </p:cNvPicPr>
+          <p:nvPr>
+            <p:ph idx="1"/>
+          </p:nvPr>
+        </p:nvPicPr>
+        <p:blipFill>
+          <a:blip r:embed="rId2"/>
+          <a:stretch>
+            <a:fillRect/>
+          </a:stretch>
+        </p:blipFill>
+        <p:spPr>
+          <a:xfrm>
+            <a:off x="4076700" y="-4572"/>
+            <a:ext cx="7334758" cy="6858000"/>
+          </a:xfrm>
+          <a:prstGeom prst="rect">
+            <a:avLst/>
+          </a:prstGeom>
+        </p:spPr>
+      </p:pic>
+      <p:sp>
+        <p:nvSpPr>
+          <p:cNvPr id="6" name="Title 1">
+            <a:extLst>
+              <a:ext uri="{FF2B5EF4-FFF2-40B4-BE49-F238E27FC236}">
+                <a16:creationId xmlns:a16="http://schemas.microsoft.com/office/drawing/2014/main" id="{AE9D7103-4CAE-4A7F-AF3E-A836EE1DF55B}"/>
+              </a:ext>
+            </a:extLst>
+          </p:cNvPr>
+          <p:cNvSpPr>
+            <a:spLocks noGrp="1"/>
+          </p:cNvSpPr>
+          <p:nvPr>
+            <p:ph type="title"/>
+          </p:nvPr>
+        </p:nvSpPr>
+        <p:spPr>
+          <a:xfrm>
+            <a:off x="252919" y="1123838"/>
+            <a:ext cx="2947482" cy="2072124"/>
+          </a:xfrm>
+        </p:spPr>
+        <p:txBody>
+          <a:bodyPr/>
+          <a:lstStyle/>
+          <a:p>
+            <a:r>
+              <a:rPr lang="en-US" dirty="0"/>
+              <a:t>Listen for signals</a:t>
+            </a:r>
+          </a:p>
+        </p:txBody>
+      </p:sp>
+      <p:sp>
+        <p:nvSpPr>
+          <p:cNvPr id="7" name="Title 1">
+            <a:extLst>
+              <a:ext uri="{FF2B5EF4-FFF2-40B4-BE49-F238E27FC236}">
+                <a16:creationId xmlns:a16="http://schemas.microsoft.com/office/drawing/2014/main" id="{44D8A3B8-38EB-4769-AD16-E0AC155A85D7}"/>
+              </a:ext>
+            </a:extLst>
+          </p:cNvPr>
+          <p:cNvSpPr txBox="1">
+            <a:spLocks/>
+          </p:cNvSpPr>
+          <p:nvPr/>
+        </p:nvSpPr>
+        <p:spPr>
+          <a:xfrm>
+            <a:off x="161923" y="2625977"/>
+            <a:ext cx="3129473" cy="2072124"/>
+          </a:xfrm>
+          <a:prstGeom prst="rect">
+            <a:avLst/>
+          </a:prstGeom>
+        </p:spPr>
+        <p:txBody>
+          <a:bodyPr vert="horz" lIns="91440" tIns="45720" rIns="91440" bIns="45720" rtlCol="0" anchor="ctr">
+            <a:normAutofit/>
+          </a:bodyPr>
+          <a:lstStyle>
+            <a:lvl1pPr algn="l" defTabSz="914400" rtl="0" eaLnBrk="1" latinLnBrk="0" hangingPunct="1">
+              <a:lnSpc>
+                <a:spcPct val="90000"/>
+              </a:lnSpc>
+              <a:spcBef>
+                <a:spcPct val="0"/>
+              </a:spcBef>
+              <a:buNone/>
+              <a:defRPr sz="3600" kern="1200" spc="-60" baseline="0">
+                <a:solidFill>
+                  <a:srgbClr val="FFFFFF"/>
+                </a:solidFill>
+                <a:latin typeface="+mj-lt"/>
+                <a:ea typeface="+mj-ea"/>
+                <a:cs typeface="+mj-cs"/>
+              </a:defRPr>
+            </a:lvl1pPr>
+          </a:lstStyle>
+          <a:p>
+            <a:pPr algn="ctr"/>
+            <a:r>
+              <a:rPr lang="en-US" sz="1400" dirty="0" err="1">
+                <a:latin typeface="Courier New" panose="02070309020205020404" pitchFamily="49" charset="0"/>
+                <a:cs typeface="Courier New" panose="02070309020205020404" pitchFamily="49" charset="0"/>
+              </a:rPr>
+              <a:t>irw</a:t>
+            </a:r>
+            <a:endParaRPr lang="en-US" sz="1400" dirty="0">
+              <a:latin typeface="Courier New" panose="02070309020205020404" pitchFamily="49" charset="0"/>
+              <a:cs typeface="Courier New" panose="02070309020205020404" pitchFamily="49" charset="0"/>
+            </a:endParaRPr>
+          </a:p>
+        </p:txBody>
+      </p:sp>
+    </p:spTree>
+    <p:extLst>
+      <p:ext uri="{BB962C8B-B14F-4D97-AF65-F5344CB8AC3E}">
+        <p14:creationId xmlns:p14="http://schemas.microsoft.com/office/powerpoint/2010/main" val="2851813677"/>
+      </p:ext>
+    </p:extLst>
+  </p:cSld>
+  <p:clrMapOvr>
+    <a:masterClrMapping/>
+  </p:clrMapOvr>
+</p:sld>
+</file>
+
+<file path=ppt/slides/slide13.xml><?xml version="1.0" encoding="utf-8"?>
+<p:sld xmlns:a="http://schemas.openxmlformats.org/drawingml/2006/main" xmlns:r="http://schemas.openxmlformats.org/officeDocument/2006/relationships" xmlns:p="http://schemas.openxmlformats.org/presentationml/2006/main">
+  <p:cSld>
+    <p:spTree>
+      <p:nvGrpSpPr>
+        <p:cNvPr id="1" name=""/>
+        <p:cNvGrpSpPr/>
+        <p:nvPr/>
+      </p:nvGrpSpPr>
+      <p:grpSpPr>
+        <a:xfrm>
+          <a:off x="0" y="0"/>
+          <a:ext cx="0" cy="0"/>
+          <a:chOff x="0" y="0"/>
+          <a:chExt cx="0" cy="0"/>
+        </a:xfrm>
+      </p:grpSpPr>
       <p:sp>
         <p:nvSpPr>
           <p:cNvPr id="2" name="Title 1">
@@ -3833,7 +4175,7 @@
 </p:sld>
 </file>
 
-<file path=ppt/slides/slide13.xml><?xml version="1.0" encoding="utf-8"?>
+<file path=ppt/slides/slide14.xml><?xml version="1.0" encoding="utf-8"?>
 <p:sld xmlns:a="http://schemas.openxmlformats.org/drawingml/2006/main" xmlns:r="http://schemas.openxmlformats.org/officeDocument/2006/relationships" xmlns:p="http://schemas.openxmlformats.org/presentationml/2006/main">
   <p:cSld>
     <p:spTree>
@@ -4465,8 +4807,8 @@
         </p:blipFill>
         <p:spPr>
           <a:xfrm>
-            <a:off x="3961645" y="863600"/>
-            <a:ext cx="7129385" cy="5121275"/>
+            <a:off x="3961645" y="765946"/>
+            <a:ext cx="7325279" cy="5261992"/>
           </a:xfrm>
         </p:spPr>
       </p:pic>
@@ -4883,7 +5225,7 @@
           <p:cNvPr id="2" name="Title 1">
             <a:extLst>
               <a:ext uri="{FF2B5EF4-FFF2-40B4-BE49-F238E27FC236}">
-                <a16:creationId xmlns:a16="http://schemas.microsoft.com/office/drawing/2014/main" id="{22A32BD3-55AE-4D95-A3D9-4423A3E146DA}"/>
+                <a16:creationId xmlns:a16="http://schemas.microsoft.com/office/drawing/2014/main" id="{15B7690D-FA38-4763-A495-2CBC00518EC4}"/>
               </a:ext>
             </a:extLst>
           </p:cNvPr>
@@ -4901,17 +5243,65 @@
           <a:p>
             <a:r>
               <a:rPr lang="en-US" dirty="0"/>
-              <a:t>Getting valid commands</a:t>
-            </a:r>
+              <a:t>Disclaimer</a:t>
+            </a:r>
+          </a:p>
+        </p:txBody>
+      </p:sp>
+      <p:sp>
+        <p:nvSpPr>
+          <p:cNvPr id="3" name="Content Placeholder 2">
+            <a:extLst>
+              <a:ext uri="{FF2B5EF4-FFF2-40B4-BE49-F238E27FC236}">
+                <a16:creationId xmlns:a16="http://schemas.microsoft.com/office/drawing/2014/main" id="{5A9B57B8-E3B0-4FDE-976B-7986C38DE172}"/>
+              </a:ext>
+            </a:extLst>
+          </p:cNvPr>
+          <p:cNvSpPr>
+            <a:spLocks noGrp="1"/>
+          </p:cNvSpPr>
+          <p:nvPr>
+            <p:ph idx="1"/>
+          </p:nvPr>
+        </p:nvSpPr>
+        <p:spPr>
+          <a:xfrm>
+            <a:off x="3869268" y="864108"/>
+            <a:ext cx="7315200" cy="1459992"/>
+          </a:xfrm>
+        </p:spPr>
+        <p:txBody>
+          <a:bodyPr/>
+          <a:lstStyle/>
+          <a:p>
+            <a:r>
+              <a:rPr lang="en-US" dirty="0"/>
+              <a:t>This is a proof-of-concept and the architecture is not designed using industry best practices</a:t>
+            </a:r>
+          </a:p>
+          <a:p>
+            <a:r>
+              <a:rPr lang="en-US" dirty="0"/>
+              <a:t>Expect bugs </a:t>
+            </a:r>
+            <a:r>
+              <a:rPr lang="en-US" dirty="0">
+                <a:sym typeface="Wingdings" panose="05000000000000000000" pitchFamily="2" charset="2"/>
+              </a:rPr>
+              <a:t></a:t>
+            </a:r>
+          </a:p>
+          <a:p>
+            <a:endParaRPr lang="en-US" dirty="0"/>
           </a:p>
         </p:txBody>
       </p:sp>
       <p:pic>
         <p:nvPicPr>
-          <p:cNvPr id="13" name="Picture 12">
+          <p:cNvPr id="5" name="Picture 4">
             <a:extLst>
               <a:ext uri="{FF2B5EF4-FFF2-40B4-BE49-F238E27FC236}">
-                <a16:creationId xmlns:a16="http://schemas.microsoft.com/office/drawing/2014/main" id="{C068B359-5185-45B8-A558-FD14F570DE17}"/>
+                <a16:creationId xmlns:a16="http://schemas.microsoft.com/office/drawing/2014/main" id="{30B14D98-E415-4857-9A0F-7635416FAD46}"/>
               </a:ext>
             </a:extLst>
           </p:cNvPr>
@@ -4928,8 +5318,8 @@
         </p:blipFill>
         <p:spPr>
           <a:xfrm>
-            <a:off x="4457699" y="0"/>
-            <a:ext cx="6145089" cy="6858000"/>
+            <a:off x="5141825" y="2192922"/>
+            <a:ext cx="4988149" cy="3800970"/>
           </a:xfrm>
           <a:prstGeom prst="rect">
             <a:avLst/>
@@ -4939,7 +5329,7 @@
     </p:spTree>
     <p:extLst>
       <p:ext uri="{BB962C8B-B14F-4D97-AF65-F5344CB8AC3E}">
-        <p14:creationId xmlns:p14="http://schemas.microsoft.com/office/powerpoint/2010/main" val="3100803108"/>
+        <p14:creationId xmlns:p14="http://schemas.microsoft.com/office/powerpoint/2010/main" val="2654052519"/>
       </p:ext>
     </p:extLst>
   </p:cSld>

</xml_diff>